<commit_message>
update to test game
</commit_message>
<xml_diff>
--- a/learn_libgdx_box2d/android/assets/editing.pptx
+++ b/learn_libgdx_box2d/android/assets/editing.pptx
@@ -6,8 +6,7 @@
   </p:sldMasterIdLst>
   <p:sldIdLst>
     <p:sldId id="256" r:id="rId2"/>
-    <p:sldId id="259" r:id="rId3"/>
-    <p:sldId id="260" r:id="rId4"/>
+    <p:sldId id="260" r:id="rId3"/>
   </p:sldIdLst>
   <p:sldSz cx="12192000" cy="6858000"/>
   <p:notesSz cx="6858000" cy="9144000"/>
@@ -263,7 +262,7 @@
           <a:p>
             <a:fld id="{6562E634-D68E-4178-96DF-74F6143C4A00}" type="datetimeFigureOut">
               <a:rPr lang="en-GB" smtClean="0"/>
-              <a:t>28/03/2022</a:t>
+              <a:t>29/03/2022</a:t>
             </a:fld>
             <a:endParaRPr lang="en-GB"/>
           </a:p>
@@ -463,7 +462,7 @@
           <a:p>
             <a:fld id="{6562E634-D68E-4178-96DF-74F6143C4A00}" type="datetimeFigureOut">
               <a:rPr lang="en-GB" smtClean="0"/>
-              <a:t>28/03/2022</a:t>
+              <a:t>29/03/2022</a:t>
             </a:fld>
             <a:endParaRPr lang="en-GB"/>
           </a:p>
@@ -673,7 +672,7 @@
           <a:p>
             <a:fld id="{6562E634-D68E-4178-96DF-74F6143C4A00}" type="datetimeFigureOut">
               <a:rPr lang="en-GB" smtClean="0"/>
-              <a:t>28/03/2022</a:t>
+              <a:t>29/03/2022</a:t>
             </a:fld>
             <a:endParaRPr lang="en-GB"/>
           </a:p>
@@ -873,7 +872,7 @@
           <a:p>
             <a:fld id="{6562E634-D68E-4178-96DF-74F6143C4A00}" type="datetimeFigureOut">
               <a:rPr lang="en-GB" smtClean="0"/>
-              <a:t>28/03/2022</a:t>
+              <a:t>29/03/2022</a:t>
             </a:fld>
             <a:endParaRPr lang="en-GB"/>
           </a:p>
@@ -1149,7 +1148,7 @@
           <a:p>
             <a:fld id="{6562E634-D68E-4178-96DF-74F6143C4A00}" type="datetimeFigureOut">
               <a:rPr lang="en-GB" smtClean="0"/>
-              <a:t>28/03/2022</a:t>
+              <a:t>29/03/2022</a:t>
             </a:fld>
             <a:endParaRPr lang="en-GB"/>
           </a:p>
@@ -1417,7 +1416,7 @@
           <a:p>
             <a:fld id="{6562E634-D68E-4178-96DF-74F6143C4A00}" type="datetimeFigureOut">
               <a:rPr lang="en-GB" smtClean="0"/>
-              <a:t>28/03/2022</a:t>
+              <a:t>29/03/2022</a:t>
             </a:fld>
             <a:endParaRPr lang="en-GB"/>
           </a:p>
@@ -1832,7 +1831,7 @@
           <a:p>
             <a:fld id="{6562E634-D68E-4178-96DF-74F6143C4A00}" type="datetimeFigureOut">
               <a:rPr lang="en-GB" smtClean="0"/>
-              <a:t>28/03/2022</a:t>
+              <a:t>29/03/2022</a:t>
             </a:fld>
             <a:endParaRPr lang="en-GB"/>
           </a:p>
@@ -1974,7 +1973,7 @@
           <a:p>
             <a:fld id="{6562E634-D68E-4178-96DF-74F6143C4A00}" type="datetimeFigureOut">
               <a:rPr lang="en-GB" smtClean="0"/>
-              <a:t>28/03/2022</a:t>
+              <a:t>29/03/2022</a:t>
             </a:fld>
             <a:endParaRPr lang="en-GB"/>
           </a:p>
@@ -2087,7 +2086,7 @@
           <a:p>
             <a:fld id="{6562E634-D68E-4178-96DF-74F6143C4A00}" type="datetimeFigureOut">
               <a:rPr lang="en-GB" smtClean="0"/>
-              <a:t>28/03/2022</a:t>
+              <a:t>29/03/2022</a:t>
             </a:fld>
             <a:endParaRPr lang="en-GB"/>
           </a:p>
@@ -2400,7 +2399,7 @@
           <a:p>
             <a:fld id="{6562E634-D68E-4178-96DF-74F6143C4A00}" type="datetimeFigureOut">
               <a:rPr lang="en-GB" smtClean="0"/>
-              <a:t>28/03/2022</a:t>
+              <a:t>29/03/2022</a:t>
             </a:fld>
             <a:endParaRPr lang="en-GB"/>
           </a:p>
@@ -2689,7 +2688,7 @@
           <a:p>
             <a:fld id="{6562E634-D68E-4178-96DF-74F6143C4A00}" type="datetimeFigureOut">
               <a:rPr lang="en-GB" smtClean="0"/>
-              <a:t>28/03/2022</a:t>
+              <a:t>29/03/2022</a:t>
             </a:fld>
             <a:endParaRPr lang="en-GB"/>
           </a:p>
@@ -2932,7 +2931,7 @@
           <a:p>
             <a:fld id="{6562E634-D68E-4178-96DF-74F6143C4A00}" type="datetimeFigureOut">
               <a:rPr lang="en-GB" smtClean="0"/>
-              <a:t>28/03/2022</a:t>
+              <a:t>29/03/2022</a:t>
             </a:fld>
             <a:endParaRPr lang="en-GB"/>
           </a:p>
@@ -3509,42 +3508,6 @@
           </a:prstGeom>
         </p:spPr>
       </p:pic>
-      <p:pic>
-        <p:nvPicPr>
-          <p:cNvPr id="3" name="Picture 2" descr="Shape&#10;&#10;Description automatically generated">
-            <a:extLst>
-              <a:ext uri="{FF2B5EF4-FFF2-40B4-BE49-F238E27FC236}">
-                <a16:creationId xmlns:a16="http://schemas.microsoft.com/office/drawing/2014/main" id="{0CD9B7B5-54B1-45A5-82BD-13367262D9BA}"/>
-              </a:ext>
-            </a:extLst>
-          </p:cNvPr>
-          <p:cNvPicPr>
-            <a:picLocks noChangeAspect="1"/>
-          </p:cNvPicPr>
-          <p:nvPr/>
-        </p:nvPicPr>
-        <p:blipFill>
-          <a:blip r:embed="rId5">
-            <a:extLst>
-              <a:ext uri="{28A0092B-C50C-407E-A947-70E740481C1C}">
-                <a14:useLocalDpi xmlns:a14="http://schemas.microsoft.com/office/drawing/2010/main" val="0"/>
-              </a:ext>
-            </a:extLst>
-          </a:blip>
-          <a:stretch>
-            <a:fillRect/>
-          </a:stretch>
-        </p:blipFill>
-        <p:spPr>
-          <a:xfrm>
-            <a:off x="4157162" y="1200329"/>
-            <a:ext cx="3877671" cy="3171411"/>
-          </a:xfrm>
-          <a:prstGeom prst="rect">
-            <a:avLst/>
-          </a:prstGeom>
-        </p:spPr>
-      </p:pic>
     </p:spTree>
     <p:extLst>
       <p:ext uri="{BB962C8B-B14F-4D97-AF65-F5344CB8AC3E}">
@@ -3575,12 +3538,258 @@
           <a:chExt cx="0" cy="0"/>
         </a:xfrm>
       </p:grpSpPr>
+      <p:sp>
+        <p:nvSpPr>
+          <p:cNvPr id="5" name="TextBox 4">
+            <a:extLst>
+              <a:ext uri="{FF2B5EF4-FFF2-40B4-BE49-F238E27FC236}">
+                <a16:creationId xmlns:a16="http://schemas.microsoft.com/office/drawing/2014/main" id="{B44F44FB-87B0-4A7B-89E4-4141F5FD81AD}"/>
+              </a:ext>
+            </a:extLst>
+          </p:cNvPr>
+          <p:cNvSpPr txBox="1"/>
+          <p:nvPr/>
+        </p:nvSpPr>
+        <p:spPr>
+          <a:xfrm>
+            <a:off x="3058486" y="-15943"/>
+            <a:ext cx="6075025" cy="1200329"/>
+          </a:xfrm>
+          <a:prstGeom prst="rect">
+            <a:avLst/>
+          </a:prstGeom>
+          <a:noFill/>
+        </p:spPr>
+        <p:txBody>
+          <a:bodyPr wrap="square" rtlCol="0">
+            <a:spAutoFit/>
+          </a:bodyPr>
+          <a:lstStyle/>
+          <a:p>
+            <a:pPr algn="ctr"/>
+            <a:r>
+              <a:rPr lang="en-US" sz="7200" dirty="0">
+                <a:solidFill>
+                  <a:srgbClr val="680040"/>
+                </a:solidFill>
+                <a:latin typeface="Bernard MT Condensed" panose="02050806060905020404" pitchFamily="18" charset="0"/>
+              </a:rPr>
+              <a:t>1 PLAYER</a:t>
+            </a:r>
+          </a:p>
+        </p:txBody>
+      </p:sp>
+      <p:sp>
+        <p:nvSpPr>
+          <p:cNvPr id="6" name="TextBox 5">
+            <a:extLst>
+              <a:ext uri="{FF2B5EF4-FFF2-40B4-BE49-F238E27FC236}">
+                <a16:creationId xmlns:a16="http://schemas.microsoft.com/office/drawing/2014/main" id="{486D4D63-9917-4AFE-8E83-A3B78CB30196}"/>
+              </a:ext>
+            </a:extLst>
+          </p:cNvPr>
+          <p:cNvSpPr txBox="1"/>
+          <p:nvPr/>
+        </p:nvSpPr>
+        <p:spPr>
+          <a:xfrm>
+            <a:off x="3058485" y="1184386"/>
+            <a:ext cx="6075025" cy="1200329"/>
+          </a:xfrm>
+          <a:prstGeom prst="rect">
+            <a:avLst/>
+          </a:prstGeom>
+          <a:noFill/>
+        </p:spPr>
+        <p:txBody>
+          <a:bodyPr wrap="square" rtlCol="0">
+            <a:spAutoFit/>
+          </a:bodyPr>
+          <a:lstStyle/>
+          <a:p>
+            <a:pPr algn="ctr"/>
+            <a:r>
+              <a:rPr lang="en-US" sz="7200" dirty="0">
+                <a:solidFill>
+                  <a:srgbClr val="680040"/>
+                </a:solidFill>
+                <a:latin typeface="Bernard MT Condensed" panose="02050806060905020404" pitchFamily="18" charset="0"/>
+              </a:rPr>
+              <a:t>2 PLAYER</a:t>
+            </a:r>
+          </a:p>
+        </p:txBody>
+      </p:sp>
+      <p:sp>
+        <p:nvSpPr>
+          <p:cNvPr id="7" name="TextBox 6">
+            <a:extLst>
+              <a:ext uri="{FF2B5EF4-FFF2-40B4-BE49-F238E27FC236}">
+                <a16:creationId xmlns:a16="http://schemas.microsoft.com/office/drawing/2014/main" id="{AA77F0AD-EF1F-4FCE-B6CB-B83E3F39E002}"/>
+              </a:ext>
+            </a:extLst>
+          </p:cNvPr>
+          <p:cNvSpPr txBox="1"/>
+          <p:nvPr/>
+        </p:nvSpPr>
+        <p:spPr>
+          <a:xfrm>
+            <a:off x="3058484" y="2384715"/>
+            <a:ext cx="6075025" cy="1200329"/>
+          </a:xfrm>
+          <a:prstGeom prst="rect">
+            <a:avLst/>
+          </a:prstGeom>
+          <a:noFill/>
+        </p:spPr>
+        <p:txBody>
+          <a:bodyPr wrap="square" rtlCol="0">
+            <a:spAutoFit/>
+          </a:bodyPr>
+          <a:lstStyle/>
+          <a:p>
+            <a:pPr algn="ctr"/>
+            <a:r>
+              <a:rPr lang="en-US" sz="7200" dirty="0">
+                <a:solidFill>
+                  <a:srgbClr val="680040"/>
+                </a:solidFill>
+                <a:latin typeface="Bernard MT Condensed" panose="02050806060905020404" pitchFamily="18" charset="0"/>
+              </a:rPr>
+              <a:t>LEADERBOARD</a:t>
+            </a:r>
+          </a:p>
+        </p:txBody>
+      </p:sp>
+      <p:sp>
+        <p:nvSpPr>
+          <p:cNvPr id="8" name="TextBox 7">
+            <a:extLst>
+              <a:ext uri="{FF2B5EF4-FFF2-40B4-BE49-F238E27FC236}">
+                <a16:creationId xmlns:a16="http://schemas.microsoft.com/office/drawing/2014/main" id="{64E98968-0DA2-430F-BA6E-3F9CB704C401}"/>
+              </a:ext>
+            </a:extLst>
+          </p:cNvPr>
+          <p:cNvSpPr txBox="1"/>
+          <p:nvPr/>
+        </p:nvSpPr>
+        <p:spPr>
+          <a:xfrm>
+            <a:off x="3058484" y="3429000"/>
+            <a:ext cx="6075025" cy="1200329"/>
+          </a:xfrm>
+          <a:prstGeom prst="rect">
+            <a:avLst/>
+          </a:prstGeom>
+          <a:noFill/>
+        </p:spPr>
+        <p:txBody>
+          <a:bodyPr wrap="square" rtlCol="0">
+            <a:spAutoFit/>
+          </a:bodyPr>
+          <a:lstStyle/>
+          <a:p>
+            <a:pPr algn="ctr"/>
+            <a:r>
+              <a:rPr lang="en-US" sz="7200" dirty="0">
+                <a:solidFill>
+                  <a:srgbClr val="680040"/>
+                </a:solidFill>
+                <a:latin typeface="Bernard MT Condensed" panose="02050806060905020404" pitchFamily="18" charset="0"/>
+              </a:rPr>
+              <a:t>SETTINGS</a:t>
+            </a:r>
+          </a:p>
+        </p:txBody>
+      </p:sp>
+      <p:sp>
+        <p:nvSpPr>
+          <p:cNvPr id="9" name="TextBox 8">
+            <a:extLst>
+              <a:ext uri="{FF2B5EF4-FFF2-40B4-BE49-F238E27FC236}">
+                <a16:creationId xmlns:a16="http://schemas.microsoft.com/office/drawing/2014/main" id="{CCF2B369-D4FC-44F5-ADAB-3635C2D29CBB}"/>
+              </a:ext>
+            </a:extLst>
+          </p:cNvPr>
+          <p:cNvSpPr txBox="1"/>
+          <p:nvPr/>
+        </p:nvSpPr>
+        <p:spPr>
+          <a:xfrm>
+            <a:off x="3058483" y="4473285"/>
+            <a:ext cx="6075025" cy="1200329"/>
+          </a:xfrm>
+          <a:prstGeom prst="rect">
+            <a:avLst/>
+          </a:prstGeom>
+          <a:noFill/>
+        </p:spPr>
+        <p:txBody>
+          <a:bodyPr wrap="square" rtlCol="0">
+            <a:spAutoFit/>
+          </a:bodyPr>
+          <a:lstStyle/>
+          <a:p>
+            <a:pPr algn="ctr"/>
+            <a:r>
+              <a:rPr lang="en-US" sz="7200" dirty="0">
+                <a:solidFill>
+                  <a:srgbClr val="680040"/>
+                </a:solidFill>
+                <a:latin typeface="Bernard MT Condensed" panose="02050806060905020404" pitchFamily="18" charset="0"/>
+              </a:rPr>
+              <a:t>PLAY AGAIN</a:t>
+            </a:r>
+          </a:p>
+        </p:txBody>
+      </p:sp>
+      <p:sp>
+        <p:nvSpPr>
+          <p:cNvPr id="10" name="TextBox 9">
+            <a:extLst>
+              <a:ext uri="{FF2B5EF4-FFF2-40B4-BE49-F238E27FC236}">
+                <a16:creationId xmlns:a16="http://schemas.microsoft.com/office/drawing/2014/main" id="{358B0C81-3F3A-422F-A673-7BA294A380FE}"/>
+              </a:ext>
+            </a:extLst>
+          </p:cNvPr>
+          <p:cNvSpPr txBox="1"/>
+          <p:nvPr/>
+        </p:nvSpPr>
+        <p:spPr>
+          <a:xfrm>
+            <a:off x="3058483" y="5517570"/>
+            <a:ext cx="6075025" cy="1200329"/>
+          </a:xfrm>
+          <a:prstGeom prst="rect">
+            <a:avLst/>
+          </a:prstGeom>
+          <a:noFill/>
+        </p:spPr>
+        <p:txBody>
+          <a:bodyPr wrap="square" rtlCol="0">
+            <a:spAutoFit/>
+          </a:bodyPr>
+          <a:lstStyle/>
+          <a:p>
+            <a:pPr algn="ctr"/>
+            <a:r>
+              <a:rPr lang="en-US" sz="7200" dirty="0">
+                <a:solidFill>
+                  <a:srgbClr val="680040"/>
+                </a:solidFill>
+                <a:latin typeface="Bernard MT Condensed" panose="02050806060905020404" pitchFamily="18" charset="0"/>
+              </a:rPr>
+              <a:t>MENU</a:t>
+            </a:r>
+          </a:p>
+        </p:txBody>
+      </p:sp>
       <p:pic>
         <p:nvPicPr>
-          <p:cNvPr id="7" name="Picture 2" descr="Wallpaper Retro, Forest, Background, Graphics, Pixels, 8bit, 8bit, PXL  images for desktop, section рендеринг - download">
-            <a:extLst>
-              <a:ext uri="{FF2B5EF4-FFF2-40B4-BE49-F238E27FC236}">
-                <a16:creationId xmlns:a16="http://schemas.microsoft.com/office/drawing/2014/main" id="{AC781701-9F1E-4788-8A62-978CD7C409DE}"/>
+          <p:cNvPr id="1026" name="Picture 2" descr="Security Symbol Lock Icon App Security Symbol For Your Web Site Design  Stock Illustration - Download Image Now - iStock">
+            <a:extLst>
+              <a:ext uri="{FF2B5EF4-FFF2-40B4-BE49-F238E27FC236}">
+                <a16:creationId xmlns:a16="http://schemas.microsoft.com/office/drawing/2014/main" id="{5AA8B78C-8492-4C8F-AE6B-65584B3773B9}"/>
               </a:ext>
             </a:extLst>
           </p:cNvPr>
@@ -3592,6 +3801,15 @@
         <p:blipFill>
           <a:blip r:embed="rId2">
             <a:extLst>
+              <a:ext uri="{BEBA8EAE-BF5A-486C-A8C5-ECC9F3942E4B}">
+                <a14:imgProps xmlns:a14="http://schemas.microsoft.com/office/drawing/2010/main">
+                  <a14:imgLayer r:embed="rId3">
+                    <a14:imgEffect>
+                      <a14:backgroundRemoval t="10000" b="90000" l="10000" r="90000"/>
+                    </a14:imgEffect>
+                  </a14:imgLayer>
+                </a14:imgProps>
+              </a:ext>
               <a:ext uri="{28A0092B-C50C-407E-A947-70E740481C1C}">
                 <a14:useLocalDpi xmlns:a14="http://schemas.microsoft.com/office/drawing/2010/main" val="0"/>
               </a:ext>
@@ -3603,9 +3821,9 @@
           </a:stretch>
         </p:blipFill>
         <p:spPr bwMode="auto">
-          <a:xfrm>
-            <a:off x="722312" y="0"/>
-            <a:ext cx="10747375" cy="6858000"/>
+          <a:xfrm rot="19555923">
+            <a:off x="7093977" y="273005"/>
+            <a:ext cx="1200329" cy="1200329"/>
           </a:xfrm>
           <a:prstGeom prst="rect">
             <a:avLst/>
@@ -3622,431 +3840,6 @@
           </a:extLst>
         </p:spPr>
       </p:pic>
-      <p:pic>
-        <p:nvPicPr>
-          <p:cNvPr id="5" name="Picture 4" descr="Chart&#10;&#10;Description automatically generated">
-            <a:extLst>
-              <a:ext uri="{FF2B5EF4-FFF2-40B4-BE49-F238E27FC236}">
-                <a16:creationId xmlns:a16="http://schemas.microsoft.com/office/drawing/2014/main" id="{4D97C775-9AF9-4A6F-ACB2-7DCE2475B5FD}"/>
-              </a:ext>
-            </a:extLst>
-          </p:cNvPr>
-          <p:cNvPicPr>
-            <a:picLocks noChangeAspect="1"/>
-          </p:cNvPicPr>
-          <p:nvPr/>
-        </p:nvPicPr>
-        <p:blipFill>
-          <a:blip r:embed="rId3">
-            <a:extLst>
-              <a:ext uri="{28A0092B-C50C-407E-A947-70E740481C1C}">
-                <a14:useLocalDpi xmlns:a14="http://schemas.microsoft.com/office/drawing/2010/main" val="0"/>
-              </a:ext>
-            </a:extLst>
-          </a:blip>
-          <a:stretch>
-            <a:fillRect/>
-          </a:stretch>
-        </p:blipFill>
-        <p:spPr>
-          <a:xfrm>
-            <a:off x="667294" y="3569101"/>
-            <a:ext cx="3282809" cy="3693160"/>
-          </a:xfrm>
-          <a:prstGeom prst="rect">
-            <a:avLst/>
-          </a:prstGeom>
-        </p:spPr>
-      </p:pic>
-      <p:sp>
-        <p:nvSpPr>
-          <p:cNvPr id="6" name="TextBox 5">
-            <a:extLst>
-              <a:ext uri="{FF2B5EF4-FFF2-40B4-BE49-F238E27FC236}">
-                <a16:creationId xmlns:a16="http://schemas.microsoft.com/office/drawing/2014/main" id="{1B2C7744-C997-4F90-A3B9-BF403A3A3F5F}"/>
-              </a:ext>
-            </a:extLst>
-          </p:cNvPr>
-          <p:cNvSpPr txBox="1"/>
-          <p:nvPr/>
-        </p:nvSpPr>
-        <p:spPr>
-          <a:xfrm>
-            <a:off x="3058486" y="-15943"/>
-            <a:ext cx="6075025" cy="1200329"/>
-          </a:xfrm>
-          <a:prstGeom prst="rect">
-            <a:avLst/>
-          </a:prstGeom>
-          <a:noFill/>
-        </p:spPr>
-        <p:txBody>
-          <a:bodyPr wrap="square" rtlCol="0">
-            <a:spAutoFit/>
-          </a:bodyPr>
-          <a:lstStyle/>
-          <a:p>
-            <a:pPr algn="ctr"/>
-            <a:r>
-              <a:rPr lang="en-US" sz="7200" dirty="0">
-                <a:solidFill>
-                  <a:srgbClr val="680040"/>
-                </a:solidFill>
-                <a:latin typeface="Bernard MT Condensed" panose="02050806060905020404" pitchFamily="18" charset="0"/>
-              </a:rPr>
-              <a:t>YOU DIED</a:t>
-            </a:r>
-          </a:p>
-        </p:txBody>
-      </p:sp>
-      <p:pic>
-        <p:nvPicPr>
-          <p:cNvPr id="10" name="Picture 9" descr="Chart&#10;&#10;Description automatically generated">
-            <a:extLst>
-              <a:ext uri="{FF2B5EF4-FFF2-40B4-BE49-F238E27FC236}">
-                <a16:creationId xmlns:a16="http://schemas.microsoft.com/office/drawing/2014/main" id="{0B3ED211-1AA3-4E3F-B55A-31500EF754CE}"/>
-              </a:ext>
-            </a:extLst>
-          </p:cNvPr>
-          <p:cNvPicPr>
-            <a:picLocks noChangeAspect="1"/>
-          </p:cNvPicPr>
-          <p:nvPr/>
-        </p:nvPicPr>
-        <p:blipFill>
-          <a:blip r:embed="rId4">
-            <a:extLst>
-              <a:ext uri="{28A0092B-C50C-407E-A947-70E740481C1C}">
-                <a14:useLocalDpi xmlns:a14="http://schemas.microsoft.com/office/drawing/2010/main" val="0"/>
-              </a:ext>
-            </a:extLst>
-          </a:blip>
-          <a:stretch>
-            <a:fillRect/>
-          </a:stretch>
-        </p:blipFill>
-        <p:spPr>
-          <a:xfrm>
-            <a:off x="8770296" y="3569101"/>
-            <a:ext cx="2789873" cy="3567379"/>
-          </a:xfrm>
-          <a:prstGeom prst="rect">
-            <a:avLst/>
-          </a:prstGeom>
-        </p:spPr>
-      </p:pic>
-      <p:pic>
-        <p:nvPicPr>
-          <p:cNvPr id="3" name="Picture 2" descr="Shape&#10;&#10;Description automatically generated">
-            <a:extLst>
-              <a:ext uri="{FF2B5EF4-FFF2-40B4-BE49-F238E27FC236}">
-                <a16:creationId xmlns:a16="http://schemas.microsoft.com/office/drawing/2014/main" id="{0CD9B7B5-54B1-45A5-82BD-13367262D9BA}"/>
-              </a:ext>
-            </a:extLst>
-          </p:cNvPr>
-          <p:cNvPicPr>
-            <a:picLocks noChangeAspect="1"/>
-          </p:cNvPicPr>
-          <p:nvPr/>
-        </p:nvPicPr>
-        <p:blipFill>
-          <a:blip r:embed="rId5">
-            <a:extLst>
-              <a:ext uri="{28A0092B-C50C-407E-A947-70E740481C1C}">
-                <a14:useLocalDpi xmlns:a14="http://schemas.microsoft.com/office/drawing/2010/main" val="0"/>
-              </a:ext>
-            </a:extLst>
-          </a:blip>
-          <a:stretch>
-            <a:fillRect/>
-          </a:stretch>
-        </p:blipFill>
-        <p:spPr>
-          <a:xfrm>
-            <a:off x="4157162" y="1200329"/>
-            <a:ext cx="3877671" cy="3171411"/>
-          </a:xfrm>
-          <a:prstGeom prst="rect">
-            <a:avLst/>
-          </a:prstGeom>
-        </p:spPr>
-      </p:pic>
-    </p:spTree>
-    <p:extLst>
-      <p:ext uri="{BB962C8B-B14F-4D97-AF65-F5344CB8AC3E}">
-        <p14:creationId xmlns:p14="http://schemas.microsoft.com/office/powerpoint/2010/main" val="4234284704"/>
-      </p:ext>
-    </p:extLst>
-  </p:cSld>
-  <p:clrMapOvr>
-    <a:masterClrMapping/>
-  </p:clrMapOvr>
-</p:sld>
-</file>
-
-<file path=ppt/slides/slide3.xml><?xml version="1.0" encoding="utf-8"?>
-<p:sld xmlns:a="http://schemas.openxmlformats.org/drawingml/2006/main" xmlns:r="http://schemas.openxmlformats.org/officeDocument/2006/relationships" xmlns:p="http://schemas.openxmlformats.org/presentationml/2006/main">
-  <p:cSld>
-    <p:spTree>
-      <p:nvGrpSpPr>
-        <p:cNvPr id="1" name=""/>
-        <p:cNvGrpSpPr/>
-        <p:nvPr/>
-      </p:nvGrpSpPr>
-      <p:grpSpPr>
-        <a:xfrm>
-          <a:off x="0" y="0"/>
-          <a:ext cx="0" cy="0"/>
-          <a:chOff x="0" y="0"/>
-          <a:chExt cx="0" cy="0"/>
-        </a:xfrm>
-      </p:grpSpPr>
-      <p:sp>
-        <p:nvSpPr>
-          <p:cNvPr id="5" name="TextBox 4">
-            <a:extLst>
-              <a:ext uri="{FF2B5EF4-FFF2-40B4-BE49-F238E27FC236}">
-                <a16:creationId xmlns:a16="http://schemas.microsoft.com/office/drawing/2014/main" id="{B44F44FB-87B0-4A7B-89E4-4141F5FD81AD}"/>
-              </a:ext>
-            </a:extLst>
-          </p:cNvPr>
-          <p:cNvSpPr txBox="1"/>
-          <p:nvPr/>
-        </p:nvSpPr>
-        <p:spPr>
-          <a:xfrm>
-            <a:off x="3058486" y="-15943"/>
-            <a:ext cx="6075025" cy="1200329"/>
-          </a:xfrm>
-          <a:prstGeom prst="rect">
-            <a:avLst/>
-          </a:prstGeom>
-          <a:noFill/>
-        </p:spPr>
-        <p:txBody>
-          <a:bodyPr wrap="square" rtlCol="0">
-            <a:spAutoFit/>
-          </a:bodyPr>
-          <a:lstStyle/>
-          <a:p>
-            <a:pPr algn="ctr"/>
-            <a:r>
-              <a:rPr lang="en-US" sz="7200" dirty="0">
-                <a:solidFill>
-                  <a:srgbClr val="680040"/>
-                </a:solidFill>
-                <a:latin typeface="Bernard MT Condensed" panose="02050806060905020404" pitchFamily="18" charset="0"/>
-              </a:rPr>
-              <a:t>1 PLAYER</a:t>
-            </a:r>
-          </a:p>
-        </p:txBody>
-      </p:sp>
-      <p:sp>
-        <p:nvSpPr>
-          <p:cNvPr id="6" name="TextBox 5">
-            <a:extLst>
-              <a:ext uri="{FF2B5EF4-FFF2-40B4-BE49-F238E27FC236}">
-                <a16:creationId xmlns:a16="http://schemas.microsoft.com/office/drawing/2014/main" id="{486D4D63-9917-4AFE-8E83-A3B78CB30196}"/>
-              </a:ext>
-            </a:extLst>
-          </p:cNvPr>
-          <p:cNvSpPr txBox="1"/>
-          <p:nvPr/>
-        </p:nvSpPr>
-        <p:spPr>
-          <a:xfrm>
-            <a:off x="3058485" y="1184386"/>
-            <a:ext cx="6075025" cy="1200329"/>
-          </a:xfrm>
-          <a:prstGeom prst="rect">
-            <a:avLst/>
-          </a:prstGeom>
-          <a:noFill/>
-        </p:spPr>
-        <p:txBody>
-          <a:bodyPr wrap="square" rtlCol="0">
-            <a:spAutoFit/>
-          </a:bodyPr>
-          <a:lstStyle/>
-          <a:p>
-            <a:pPr algn="ctr"/>
-            <a:r>
-              <a:rPr lang="en-US" sz="7200" dirty="0">
-                <a:solidFill>
-                  <a:srgbClr val="680040"/>
-                </a:solidFill>
-                <a:latin typeface="Bernard MT Condensed" panose="02050806060905020404" pitchFamily="18" charset="0"/>
-              </a:rPr>
-              <a:t>2 PLAYER</a:t>
-            </a:r>
-          </a:p>
-        </p:txBody>
-      </p:sp>
-      <p:sp>
-        <p:nvSpPr>
-          <p:cNvPr id="7" name="TextBox 6">
-            <a:extLst>
-              <a:ext uri="{FF2B5EF4-FFF2-40B4-BE49-F238E27FC236}">
-                <a16:creationId xmlns:a16="http://schemas.microsoft.com/office/drawing/2014/main" id="{AA77F0AD-EF1F-4FCE-B6CB-B83E3F39E002}"/>
-              </a:ext>
-            </a:extLst>
-          </p:cNvPr>
-          <p:cNvSpPr txBox="1"/>
-          <p:nvPr/>
-        </p:nvSpPr>
-        <p:spPr>
-          <a:xfrm>
-            <a:off x="3058484" y="2384715"/>
-            <a:ext cx="6075025" cy="1200329"/>
-          </a:xfrm>
-          <a:prstGeom prst="rect">
-            <a:avLst/>
-          </a:prstGeom>
-          <a:noFill/>
-        </p:spPr>
-        <p:txBody>
-          <a:bodyPr wrap="square" rtlCol="0">
-            <a:spAutoFit/>
-          </a:bodyPr>
-          <a:lstStyle/>
-          <a:p>
-            <a:pPr algn="ctr"/>
-            <a:r>
-              <a:rPr lang="en-US" sz="7200" dirty="0">
-                <a:solidFill>
-                  <a:srgbClr val="680040"/>
-                </a:solidFill>
-                <a:latin typeface="Bernard MT Condensed" panose="02050806060905020404" pitchFamily="18" charset="0"/>
-              </a:rPr>
-              <a:t>LEADERBOARD</a:t>
-            </a:r>
-          </a:p>
-        </p:txBody>
-      </p:sp>
-      <p:sp>
-        <p:nvSpPr>
-          <p:cNvPr id="8" name="TextBox 7">
-            <a:extLst>
-              <a:ext uri="{FF2B5EF4-FFF2-40B4-BE49-F238E27FC236}">
-                <a16:creationId xmlns:a16="http://schemas.microsoft.com/office/drawing/2014/main" id="{64E98968-0DA2-430F-BA6E-3F9CB704C401}"/>
-              </a:ext>
-            </a:extLst>
-          </p:cNvPr>
-          <p:cNvSpPr txBox="1"/>
-          <p:nvPr/>
-        </p:nvSpPr>
-        <p:spPr>
-          <a:xfrm>
-            <a:off x="3058484" y="3429000"/>
-            <a:ext cx="6075025" cy="1200329"/>
-          </a:xfrm>
-          <a:prstGeom prst="rect">
-            <a:avLst/>
-          </a:prstGeom>
-          <a:noFill/>
-        </p:spPr>
-        <p:txBody>
-          <a:bodyPr wrap="square" rtlCol="0">
-            <a:spAutoFit/>
-          </a:bodyPr>
-          <a:lstStyle/>
-          <a:p>
-            <a:pPr algn="ctr"/>
-            <a:r>
-              <a:rPr lang="en-US" sz="7200" dirty="0">
-                <a:solidFill>
-                  <a:srgbClr val="680040"/>
-                </a:solidFill>
-                <a:latin typeface="Bernard MT Condensed" panose="02050806060905020404" pitchFamily="18" charset="0"/>
-              </a:rPr>
-              <a:t>SETTINGS</a:t>
-            </a:r>
-          </a:p>
-        </p:txBody>
-      </p:sp>
-      <p:sp>
-        <p:nvSpPr>
-          <p:cNvPr id="9" name="TextBox 8">
-            <a:extLst>
-              <a:ext uri="{FF2B5EF4-FFF2-40B4-BE49-F238E27FC236}">
-                <a16:creationId xmlns:a16="http://schemas.microsoft.com/office/drawing/2014/main" id="{CCF2B369-D4FC-44F5-ADAB-3635C2D29CBB}"/>
-              </a:ext>
-            </a:extLst>
-          </p:cNvPr>
-          <p:cNvSpPr txBox="1"/>
-          <p:nvPr/>
-        </p:nvSpPr>
-        <p:spPr>
-          <a:xfrm>
-            <a:off x="3058483" y="4473285"/>
-            <a:ext cx="6075025" cy="1200329"/>
-          </a:xfrm>
-          <a:prstGeom prst="rect">
-            <a:avLst/>
-          </a:prstGeom>
-          <a:noFill/>
-        </p:spPr>
-        <p:txBody>
-          <a:bodyPr wrap="square" rtlCol="0">
-            <a:spAutoFit/>
-          </a:bodyPr>
-          <a:lstStyle/>
-          <a:p>
-            <a:pPr algn="ctr"/>
-            <a:r>
-              <a:rPr lang="en-US" sz="7200" dirty="0">
-                <a:solidFill>
-                  <a:srgbClr val="680040"/>
-                </a:solidFill>
-                <a:latin typeface="Bernard MT Condensed" panose="02050806060905020404" pitchFamily="18" charset="0"/>
-              </a:rPr>
-              <a:t>PLAY AGAIN</a:t>
-            </a:r>
-          </a:p>
-        </p:txBody>
-      </p:sp>
-      <p:sp>
-        <p:nvSpPr>
-          <p:cNvPr id="10" name="TextBox 9">
-            <a:extLst>
-              <a:ext uri="{FF2B5EF4-FFF2-40B4-BE49-F238E27FC236}">
-                <a16:creationId xmlns:a16="http://schemas.microsoft.com/office/drawing/2014/main" id="{358B0C81-3F3A-422F-A673-7BA294A380FE}"/>
-              </a:ext>
-            </a:extLst>
-          </p:cNvPr>
-          <p:cNvSpPr txBox="1"/>
-          <p:nvPr/>
-        </p:nvSpPr>
-        <p:spPr>
-          <a:xfrm>
-            <a:off x="3058483" y="5517570"/>
-            <a:ext cx="6075025" cy="1200329"/>
-          </a:xfrm>
-          <a:prstGeom prst="rect">
-            <a:avLst/>
-          </a:prstGeom>
-          <a:noFill/>
-        </p:spPr>
-        <p:txBody>
-          <a:bodyPr wrap="square" rtlCol="0">
-            <a:spAutoFit/>
-          </a:bodyPr>
-          <a:lstStyle/>
-          <a:p>
-            <a:pPr algn="ctr"/>
-            <a:r>
-              <a:rPr lang="en-US" sz="7200" dirty="0">
-                <a:solidFill>
-                  <a:srgbClr val="680040"/>
-                </a:solidFill>
-                <a:latin typeface="Bernard MT Condensed" panose="02050806060905020404" pitchFamily="18" charset="0"/>
-              </a:rPr>
-              <a:t>MENU</a:t>
-            </a:r>
-          </a:p>
-        </p:txBody>
-      </p:sp>
     </p:spTree>
     <p:extLst>
       <p:ext uri="{BB962C8B-B14F-4D97-AF65-F5344CB8AC3E}">

</xml_diff>